<commit_message>
Edited typo in ppt. Updated example numbers on github.
</commit_message>
<xml_diff>
--- a/week7/week7.pptx
+++ b/week7/week7.pptx
@@ -367,7 +367,7 @@
           <a:p>
             <a:fld id="{4AAD347D-5ACD-4C99-B74B-A9C85AD731AF}" type="datetimeFigureOut">
               <a:rPr lang="en-US" dirty="0"/>
-              <a:t>7/9/2018</a:t>
+              <a:t>7/16/2018</a:t>
             </a:fld>
             <a:endParaRPr lang="en-US" dirty="0"/>
           </a:p>
@@ -637,7 +637,7 @@
           <a:p>
             <a:fld id="{4509A250-FF31-4206-8172-F9D3106AACB1}" type="datetimeFigureOut">
               <a:rPr lang="en-US" dirty="0"/>
-              <a:t>7/9/2018</a:t>
+              <a:t>7/16/2018</a:t>
             </a:fld>
             <a:endParaRPr lang="en-US" dirty="0"/>
           </a:p>
@@ -826,7 +826,7 @@
           <a:p>
             <a:fld id="{4509A250-FF31-4206-8172-F9D3106AACB1}" type="datetimeFigureOut">
               <a:rPr lang="en-US" dirty="0"/>
-              <a:t>7/9/2018</a:t>
+              <a:t>7/16/2018</a:t>
             </a:fld>
             <a:endParaRPr lang="en-US" dirty="0"/>
           </a:p>
@@ -1094,7 +1094,7 @@
           <a:p>
             <a:fld id="{4509A250-FF31-4206-8172-F9D3106AACB1}" type="datetimeFigureOut">
               <a:rPr lang="en-US" dirty="0"/>
-              <a:t>7/9/2018</a:t>
+              <a:t>7/16/2018</a:t>
             </a:fld>
             <a:endParaRPr lang="en-US" dirty="0"/>
           </a:p>
@@ -1430,7 +1430,7 @@
           <a:p>
             <a:fld id="{4509A250-FF31-4206-8172-F9D3106AACB1}" type="datetimeFigureOut">
               <a:rPr lang="en-US" dirty="0"/>
-              <a:t>7/9/2018</a:t>
+              <a:t>7/16/2018</a:t>
             </a:fld>
             <a:endParaRPr lang="en-US" dirty="0"/>
           </a:p>
@@ -2048,7 +2048,7 @@
           <a:p>
             <a:fld id="{4509A250-FF31-4206-8172-F9D3106AACB1}" type="datetimeFigureOut">
               <a:rPr lang="en-US" dirty="0"/>
-              <a:t>7/9/2018</a:t>
+              <a:t>7/16/2018</a:t>
             </a:fld>
             <a:endParaRPr lang="en-US" dirty="0"/>
           </a:p>
@@ -2903,7 +2903,7 @@
           <a:p>
             <a:fld id="{4509A250-FF31-4206-8172-F9D3106AACB1}" type="datetimeFigureOut">
               <a:rPr lang="en-US" dirty="0"/>
-              <a:t>7/9/2018</a:t>
+              <a:t>7/16/2018</a:t>
             </a:fld>
             <a:endParaRPr lang="en-US" dirty="0"/>
           </a:p>
@@ -3068,7 +3068,7 @@
           <a:p>
             <a:fld id="{4509A250-FF31-4206-8172-F9D3106AACB1}" type="datetimeFigureOut">
               <a:rPr lang="en-US" dirty="0"/>
-              <a:t>7/9/2018</a:t>
+              <a:t>7/16/2018</a:t>
             </a:fld>
             <a:endParaRPr lang="en-US" dirty="0"/>
           </a:p>
@@ -3243,7 +3243,7 @@
           <a:p>
             <a:fld id="{4509A250-FF31-4206-8172-F9D3106AACB1}" type="datetimeFigureOut">
               <a:rPr lang="en-US" dirty="0"/>
-              <a:t>7/9/2018</a:t>
+              <a:t>7/16/2018</a:t>
             </a:fld>
             <a:endParaRPr lang="en-US" dirty="0"/>
           </a:p>
@@ -3408,7 +3408,7 @@
           <a:p>
             <a:fld id="{4509A250-FF31-4206-8172-F9D3106AACB1}" type="datetimeFigureOut">
               <a:rPr lang="en-US" dirty="0"/>
-              <a:t>7/9/2018</a:t>
+              <a:t>7/16/2018</a:t>
             </a:fld>
             <a:endParaRPr lang="en-US" dirty="0"/>
           </a:p>
@@ -3650,7 +3650,7 @@
           <a:p>
             <a:fld id="{9796027F-7875-4030-9381-8BD8C4F21935}" type="datetimeFigureOut">
               <a:rPr lang="en-US" dirty="0"/>
-              <a:t>7/9/2018</a:t>
+              <a:t>7/16/2018</a:t>
             </a:fld>
             <a:endParaRPr lang="en-US" dirty="0"/>
           </a:p>
@@ -3937,7 +3937,7 @@
           <a:p>
             <a:fld id="{9796027F-7875-4030-9381-8BD8C4F21935}" type="datetimeFigureOut">
               <a:rPr lang="en-US" dirty="0"/>
-              <a:t>7/9/2018</a:t>
+              <a:t>7/16/2018</a:t>
             </a:fld>
             <a:endParaRPr lang="en-US" dirty="0"/>
           </a:p>
@@ -4376,7 +4376,7 @@
           <a:p>
             <a:fld id="{9796027F-7875-4030-9381-8BD8C4F21935}" type="datetimeFigureOut">
               <a:rPr lang="en-US" dirty="0"/>
-              <a:t>7/9/2018</a:t>
+              <a:t>7/16/2018</a:t>
             </a:fld>
             <a:endParaRPr lang="en-US" dirty="0"/>
           </a:p>
@@ -4489,7 +4489,7 @@
           <a:p>
             <a:fld id="{4509A250-FF31-4206-8172-F9D3106AACB1}" type="datetimeFigureOut">
               <a:rPr lang="en-US" dirty="0"/>
-              <a:t>7/9/2018</a:t>
+              <a:t>7/16/2018</a:t>
             </a:fld>
             <a:endParaRPr lang="en-US" dirty="0"/>
           </a:p>
@@ -4579,7 +4579,7 @@
           <a:p>
             <a:fld id="{4509A250-FF31-4206-8172-F9D3106AACB1}" type="datetimeFigureOut">
               <a:rPr lang="en-US" dirty="0"/>
-              <a:t>7/9/2018</a:t>
+              <a:t>7/16/2018</a:t>
             </a:fld>
             <a:endParaRPr lang="en-US" dirty="0"/>
           </a:p>
@@ -4853,7 +4853,7 @@
           <a:p>
             <a:fld id="{4509A250-FF31-4206-8172-F9D3106AACB1}" type="datetimeFigureOut">
               <a:rPr lang="en-US" dirty="0"/>
-              <a:t>7/9/2018</a:t>
+              <a:t>7/16/2018</a:t>
             </a:fld>
             <a:endParaRPr lang="en-US" dirty="0"/>
           </a:p>
@@ -5123,7 +5123,7 @@
           <a:p>
             <a:fld id="{4509A250-FF31-4206-8172-F9D3106AACB1}" type="datetimeFigureOut">
               <a:rPr lang="en-US" dirty="0"/>
-              <a:t>7/9/2018</a:t>
+              <a:t>7/16/2018</a:t>
             </a:fld>
             <a:endParaRPr lang="en-US" dirty="0"/>
           </a:p>
@@ -5547,7 +5547,7 @@
           <a:p>
             <a:fld id="{4AAD347D-5ACD-4C99-B74B-A9C85AD731AF}" type="datetimeFigureOut">
               <a:rPr lang="en-US" dirty="0"/>
-              <a:t>7/9/2018</a:t>
+              <a:t>7/16/2018</a:t>
             </a:fld>
             <a:endParaRPr lang="en-US" dirty="0"/>
           </a:p>
@@ -7800,28 +7800,40 @@
                 <a:latin typeface="Courier New" panose="02070309020205020404" pitchFamily="49" charset="0"/>
                 <a:cs typeface="Courier New" panose="02070309020205020404" pitchFamily="49" charset="0"/>
               </a:rPr>
-              <a:t>print_seperated</a:t>
+              <a:t>print_separated</a:t>
             </a:r>
             <a:r>
               <a:rPr lang="en-GB" dirty="0">
                 <a:latin typeface="Courier New" panose="02070309020205020404" pitchFamily="49" charset="0"/>
                 <a:cs typeface="Courier New" panose="02070309020205020404" pitchFamily="49" charset="0"/>
               </a:rPr>
-              <a:t>(items, </a:t>
+              <a:t>(items, separator=" "):</a:t>
+            </a:r>
+          </a:p>
+          <a:p>
+            <a:pPr marL="0" indent="0">
+              <a:buNone/>
+            </a:pPr>
+            <a:r>
+              <a:rPr lang="en-GB" dirty="0">
+                <a:latin typeface="Courier New" panose="02070309020205020404" pitchFamily="49" charset="0"/>
+                <a:cs typeface="Courier New" panose="02070309020205020404" pitchFamily="49" charset="0"/>
+              </a:rPr>
+              <a:t>    for </a:t>
             </a:r>
             <a:r>
               <a:rPr lang="en-GB" dirty="0" err="1">
                 <a:latin typeface="Courier New" panose="02070309020205020404" pitchFamily="49" charset="0"/>
                 <a:cs typeface="Courier New" panose="02070309020205020404" pitchFamily="49" charset="0"/>
               </a:rPr>
-              <a:t>seperator</a:t>
+              <a:t>i</a:t>
             </a:r>
             <a:r>
               <a:rPr lang="en-GB" dirty="0">
                 <a:latin typeface="Courier New" panose="02070309020205020404" pitchFamily="49" charset="0"/>
                 <a:cs typeface="Courier New" panose="02070309020205020404" pitchFamily="49" charset="0"/>
               </a:rPr>
-              <a:t>=" "):</a:t>
+              <a:t> in items[:-1]:</a:t>
             </a:r>
           </a:p>
           <a:p>
@@ -7833,7 +7845,7 @@
                 <a:latin typeface="Courier New" panose="02070309020205020404" pitchFamily="49" charset="0"/>
                 <a:cs typeface="Courier New" panose="02070309020205020404" pitchFamily="49" charset="0"/>
               </a:rPr>
-              <a:t>    for </a:t>
+              <a:t>        print (f"{</a:t>
             </a:r>
             <a:r>
               <a:rPr lang="en-GB" dirty="0" err="1">
@@ -7847,47 +7859,7 @@
                 <a:latin typeface="Courier New" panose="02070309020205020404" pitchFamily="49" charset="0"/>
                 <a:cs typeface="Courier New" panose="02070309020205020404" pitchFamily="49" charset="0"/>
               </a:rPr>
-              <a:t> in items[:-1]:</a:t>
-            </a:r>
-          </a:p>
-          <a:p>
-            <a:pPr marL="0" indent="0">
-              <a:buNone/>
-            </a:pPr>
-            <a:r>
-              <a:rPr lang="en-GB" dirty="0">
-                <a:latin typeface="Courier New" panose="02070309020205020404" pitchFamily="49" charset="0"/>
-                <a:cs typeface="Courier New" panose="02070309020205020404" pitchFamily="49" charset="0"/>
-              </a:rPr>
-              <a:t>        print (f"{</a:t>
-            </a:r>
-            <a:r>
-              <a:rPr lang="en-GB" dirty="0" err="1">
-                <a:latin typeface="Courier New" panose="02070309020205020404" pitchFamily="49" charset="0"/>
-                <a:cs typeface="Courier New" panose="02070309020205020404" pitchFamily="49" charset="0"/>
-              </a:rPr>
-              <a:t>i</a:t>
-            </a:r>
-            <a:r>
-              <a:rPr lang="en-GB" dirty="0">
-                <a:latin typeface="Courier New" panose="02070309020205020404" pitchFamily="49" charset="0"/>
-                <a:cs typeface="Courier New" panose="02070309020205020404" pitchFamily="49" charset="0"/>
-              </a:rPr>
-              <a:t>}{</a:t>
-            </a:r>
-            <a:r>
-              <a:rPr lang="en-GB" dirty="0" err="1">
-                <a:latin typeface="Courier New" panose="02070309020205020404" pitchFamily="49" charset="0"/>
-                <a:cs typeface="Courier New" panose="02070309020205020404" pitchFamily="49" charset="0"/>
-              </a:rPr>
-              <a:t>seperator</a:t>
-            </a:r>
-            <a:r>
-              <a:rPr lang="en-GB" dirty="0">
-                <a:latin typeface="Courier New" panose="02070309020205020404" pitchFamily="49" charset="0"/>
-                <a:cs typeface="Courier New" panose="02070309020205020404" pitchFamily="49" charset="0"/>
-              </a:rPr>
-              <a:t>}", end="")</a:t>
+              <a:t>}{separator}", end="")</a:t>
             </a:r>
           </a:p>
           <a:p>
@@ -7941,7 +7913,7 @@
                 <a:latin typeface="Courier New" panose="02070309020205020404" pitchFamily="49" charset="0"/>
                 <a:cs typeface="Courier New" panose="02070309020205020404" pitchFamily="49" charset="0"/>
               </a:rPr>
-              <a:t>print_seperated</a:t>
+              <a:t>print_separated</a:t>
             </a:r>
             <a:r>
               <a:rPr lang="en-GB" dirty="0">
@@ -7960,28 +7932,33 @@
                 <a:latin typeface="Courier New" panose="02070309020205020404" pitchFamily="49" charset="0"/>
                 <a:cs typeface="Courier New" panose="02070309020205020404" pitchFamily="49" charset="0"/>
               </a:rPr>
-              <a:t>print_seperated</a:t>
+              <a:t>print_separated</a:t>
             </a:r>
             <a:r>
               <a:rPr lang="en-GB" dirty="0">
                 <a:latin typeface="Courier New" panose="02070309020205020404" pitchFamily="49" charset="0"/>
                 <a:cs typeface="Courier New" panose="02070309020205020404" pitchFamily="49" charset="0"/>
               </a:rPr>
-              <a:t>(numbers, </a:t>
-            </a:r>
+              <a:t>(numbers, separator=",")</a:t>
+            </a:r>
+          </a:p>
+          <a:p>
+            <a:pPr marL="0" indent="0">
+              <a:buNone/>
+            </a:pPr>
             <a:r>
               <a:rPr lang="en-GB" dirty="0" err="1">
                 <a:latin typeface="Courier New" panose="02070309020205020404" pitchFamily="49" charset="0"/>
                 <a:cs typeface="Courier New" panose="02070309020205020404" pitchFamily="49" charset="0"/>
               </a:rPr>
-              <a:t>seperator</a:t>
+              <a:t>print_separated</a:t>
             </a:r>
             <a:r>
               <a:rPr lang="en-GB" dirty="0">
                 <a:latin typeface="Courier New" panose="02070309020205020404" pitchFamily="49" charset="0"/>
                 <a:cs typeface="Courier New" panose="02070309020205020404" pitchFamily="49" charset="0"/>
               </a:rPr>
-              <a:t>=",")</a:t>
+              <a:t>(numbers, separator=", ")</a:t>
             </a:r>
           </a:p>
           <a:p>
@@ -7993,94 +7970,33 @@
                 <a:latin typeface="Courier New" panose="02070309020205020404" pitchFamily="49" charset="0"/>
                 <a:cs typeface="Courier New" panose="02070309020205020404" pitchFamily="49" charset="0"/>
               </a:rPr>
-              <a:t>print_seperated</a:t>
+              <a:t>print_separated</a:t>
             </a:r>
             <a:r>
               <a:rPr lang="en-GB" dirty="0">
                 <a:latin typeface="Courier New" panose="02070309020205020404" pitchFamily="49" charset="0"/>
                 <a:cs typeface="Courier New" panose="02070309020205020404" pitchFamily="49" charset="0"/>
               </a:rPr>
-              <a:t>(numbers, </a:t>
-            </a:r>
+              <a:t>(numbers, separator="--&gt;")</a:t>
+            </a:r>
+          </a:p>
+          <a:p>
+            <a:pPr marL="0" indent="0">
+              <a:buNone/>
+            </a:pPr>
             <a:r>
               <a:rPr lang="en-GB" dirty="0" err="1">
                 <a:latin typeface="Courier New" panose="02070309020205020404" pitchFamily="49" charset="0"/>
                 <a:cs typeface="Courier New" panose="02070309020205020404" pitchFamily="49" charset="0"/>
               </a:rPr>
-              <a:t>seperator</a:t>
+              <a:t>print_separated</a:t>
             </a:r>
             <a:r>
               <a:rPr lang="en-GB" dirty="0">
                 <a:latin typeface="Courier New" panose="02070309020205020404" pitchFamily="49" charset="0"/>
                 <a:cs typeface="Courier New" panose="02070309020205020404" pitchFamily="49" charset="0"/>
               </a:rPr>
-              <a:t>=", ")</a:t>
-            </a:r>
-          </a:p>
-          <a:p>
-            <a:pPr marL="0" indent="0">
-              <a:buNone/>
-            </a:pPr>
-            <a:r>
-              <a:rPr lang="en-GB" dirty="0" err="1">
-                <a:latin typeface="Courier New" panose="02070309020205020404" pitchFamily="49" charset="0"/>
-                <a:cs typeface="Courier New" panose="02070309020205020404" pitchFamily="49" charset="0"/>
-              </a:rPr>
-              <a:t>print_seperated</a:t>
-            </a:r>
-            <a:r>
-              <a:rPr lang="en-GB" dirty="0">
-                <a:latin typeface="Courier New" panose="02070309020205020404" pitchFamily="49" charset="0"/>
-                <a:cs typeface="Courier New" panose="02070309020205020404" pitchFamily="49" charset="0"/>
-              </a:rPr>
-              <a:t>(numbers, </a:t>
-            </a:r>
-            <a:r>
-              <a:rPr lang="en-GB" dirty="0" err="1">
-                <a:latin typeface="Courier New" panose="02070309020205020404" pitchFamily="49" charset="0"/>
-                <a:cs typeface="Courier New" panose="02070309020205020404" pitchFamily="49" charset="0"/>
-              </a:rPr>
-              <a:t>seperator</a:t>
-            </a:r>
-            <a:r>
-              <a:rPr lang="en-GB" dirty="0">
-                <a:latin typeface="Courier New" panose="02070309020205020404" pitchFamily="49" charset="0"/>
-                <a:cs typeface="Courier New" panose="02070309020205020404" pitchFamily="49" charset="0"/>
-              </a:rPr>
-              <a:t>="--&gt;")</a:t>
-            </a:r>
-          </a:p>
-          <a:p>
-            <a:pPr marL="0" indent="0">
-              <a:buNone/>
-            </a:pPr>
-            <a:r>
-              <a:rPr lang="en-GB" dirty="0" err="1">
-                <a:latin typeface="Courier New" panose="02070309020205020404" pitchFamily="49" charset="0"/>
-                <a:cs typeface="Courier New" panose="02070309020205020404" pitchFamily="49" charset="0"/>
-              </a:rPr>
-              <a:t>print_seperated</a:t>
-            </a:r>
-            <a:r>
-              <a:rPr lang="en-GB" dirty="0">
-                <a:latin typeface="Courier New" panose="02070309020205020404" pitchFamily="49" charset="0"/>
-                <a:cs typeface="Courier New" panose="02070309020205020404" pitchFamily="49" charset="0"/>
-              </a:rPr>
-              <a:t>(numbers, </a:t>
-            </a:r>
-            <a:r>
-              <a:rPr lang="en-GB" dirty="0" err="1">
-                <a:latin typeface="Courier New" panose="02070309020205020404" pitchFamily="49" charset="0"/>
-                <a:cs typeface="Courier New" panose="02070309020205020404" pitchFamily="49" charset="0"/>
-              </a:rPr>
-              <a:t>seperator</a:t>
-            </a:r>
-            <a:r>
-              <a:rPr lang="en-GB" dirty="0">
-                <a:latin typeface="Courier New" panose="02070309020205020404" pitchFamily="49" charset="0"/>
-                <a:cs typeface="Courier New" panose="02070309020205020404" pitchFamily="49" charset="0"/>
-              </a:rPr>
-              <a:t>="\n")</a:t>
+              <a:t>(numbers, separator="\n")</a:t>
             </a:r>
           </a:p>
           <a:p>

</xml_diff>

<commit_message>
changed "square" to "rectangle" for accuracy
</commit_message>
<xml_diff>
--- a/week7/week7.pptx
+++ b/week7/week7.pptx
@@ -10486,7 +10486,7 @@
         <p:spPr>
           <a:xfrm>
             <a:off x="646111" y="1517463"/>
-            <a:ext cx="5573457" cy="2516073"/>
+            <a:ext cx="5573457" cy="3162404"/>
           </a:xfrm>
           <a:prstGeom prst="rect">
             <a:avLst/>
@@ -10518,7 +10518,7 @@
                 <a:latin typeface="Courier New" panose="02070309020205020404" pitchFamily="49" charset="0"/>
                 <a:cs typeface="Courier New" panose="02070309020205020404" pitchFamily="49" charset="0"/>
               </a:rPr>
-              <a:t># Calculate the area of a square.</a:t>
+              <a:t># Calculate the area of a rectangle.</a:t>
             </a:r>
           </a:p>
           <a:p>
@@ -10541,7 +10541,7 @@
                 <a:latin typeface="Courier New" panose="02070309020205020404" pitchFamily="49" charset="0"/>
                 <a:cs typeface="Courier New" panose="02070309020205020404" pitchFamily="49" charset="0"/>
               </a:rPr>
-              <a:t> square with sides 3m by 5m has area { 3 * 5 }m squared")</a:t>
+              <a:t> rectangle with sides 3m by 5m has area { 3 * 5 }m squared")</a:t>
             </a:r>
           </a:p>
           <a:p>
@@ -10556,7 +10556,7 @@
                 <a:latin typeface="Courier New" panose="02070309020205020404" pitchFamily="49" charset="0"/>
                 <a:cs typeface="Courier New" panose="02070309020205020404" pitchFamily="49" charset="0"/>
               </a:rPr>
-              <a:t># Calculate the area of a different square.</a:t>
+              <a:t># Calculate the area of a different rectangle.</a:t>
             </a:r>
           </a:p>
           <a:p>
@@ -10579,7 +10579,7 @@
                 <a:latin typeface="Courier New" panose="02070309020205020404" pitchFamily="49" charset="0"/>
                 <a:cs typeface="Courier New" panose="02070309020205020404" pitchFamily="49" charset="0"/>
               </a:rPr>
-              <a:t> square with sides 2m by 6m has area { 2 * 6 }m squared")</a:t>
+              <a:t> rectangle with sides 2m by 6m has area { 2 * 6 }m squared")</a:t>
             </a:r>
           </a:p>
           <a:p>
@@ -10594,7 +10594,7 @@
                 <a:latin typeface="Courier New" panose="02070309020205020404" pitchFamily="49" charset="0"/>
                 <a:cs typeface="Courier New" panose="02070309020205020404" pitchFamily="49" charset="0"/>
               </a:rPr>
-              <a:t># Calculate the area of yet another different square.</a:t>
+              <a:t># Calculate the area of yet another different rectangle.</a:t>
             </a:r>
           </a:p>
           <a:p>
@@ -10617,7 +10617,7 @@
                 <a:latin typeface="Courier New" panose="02070309020205020404" pitchFamily="49" charset="0"/>
                 <a:cs typeface="Courier New" panose="02070309020205020404" pitchFamily="49" charset="0"/>
               </a:rPr>
-              <a:t> square with sides 5m by 7m has area { 5 * 7 }m squared")</a:t>
+              <a:t> rectangle with sides 5m by 7m has area { 5 * 7 }m squared")</a:t>
             </a:r>
           </a:p>
           <a:p>
@@ -10632,7 +10632,7 @@
                 <a:latin typeface="Courier New" panose="02070309020205020404" pitchFamily="49" charset="0"/>
                 <a:cs typeface="Courier New" panose="02070309020205020404" pitchFamily="49" charset="0"/>
               </a:rPr>
-              <a:t># Calculate the area of a final square</a:t>
+              <a:t># Calculate the area of a final rectangle</a:t>
             </a:r>
           </a:p>
           <a:p>
@@ -10655,7 +10655,7 @@
                 <a:latin typeface="Courier New" panose="02070309020205020404" pitchFamily="49" charset="0"/>
                 <a:cs typeface="Courier New" panose="02070309020205020404" pitchFamily="49" charset="0"/>
               </a:rPr>
-              <a:t> square with sides 4m by 4m has area { 4 * 4 }m squared")</a:t>
+              <a:t> rectangle with sides 4m by 4m has area { 4 * 4 }m squared")</a:t>
             </a:r>
           </a:p>
           <a:p>
@@ -10681,7 +10681,7 @@
         <p:spPr>
           <a:xfrm>
             <a:off x="6096000" y="1517463"/>
-            <a:ext cx="6096000" cy="1546577"/>
+            <a:ext cx="6096000" cy="1708160"/>
           </a:xfrm>
           <a:prstGeom prst="rect">
             <a:avLst/>
@@ -10709,69 +10709,62 @@
           </a:p>
           <a:p>
             <a:r>
+              <a:rPr lang="en-GB" sz="1050" dirty="0">
+                <a:latin typeface="Courier New" panose="02070309020205020404" pitchFamily="49" charset="0"/>
+                <a:cs typeface="Courier New" panose="02070309020205020404" pitchFamily="49" charset="0"/>
+              </a:rPr>
+              <a:t>def </a:t>
+            </a:r>
+            <a:r>
               <a:rPr lang="en-GB" sz="1050" dirty="0" err="1">
                 <a:latin typeface="Courier New" panose="02070309020205020404" pitchFamily="49" charset="0"/>
                 <a:cs typeface="Courier New" panose="02070309020205020404" pitchFamily="49" charset="0"/>
               </a:rPr>
-              <a:t>def</a:t>
+              <a:t>print_area_rectangle</a:t>
             </a:r>
             <a:r>
               <a:rPr lang="en-GB" sz="1050" dirty="0">
                 <a:latin typeface="Courier New" panose="02070309020205020404" pitchFamily="49" charset="0"/>
                 <a:cs typeface="Courier New" panose="02070309020205020404" pitchFamily="49" charset="0"/>
               </a:rPr>
-              <a:t> </a:t>
+              <a:t>(</a:t>
             </a:r>
             <a:r>
               <a:rPr lang="en-GB" sz="1050" dirty="0" err="1">
                 <a:latin typeface="Courier New" panose="02070309020205020404" pitchFamily="49" charset="0"/>
                 <a:cs typeface="Courier New" panose="02070309020205020404" pitchFamily="49" charset="0"/>
               </a:rPr>
-              <a:t>print_area_square</a:t>
+              <a:t>a,b</a:t>
             </a:r>
             <a:r>
               <a:rPr lang="en-GB" sz="1050" dirty="0">
                 <a:latin typeface="Courier New" panose="02070309020205020404" pitchFamily="49" charset="0"/>
                 <a:cs typeface="Courier New" panose="02070309020205020404" pitchFamily="49" charset="0"/>
               </a:rPr>
-              <a:t>(</a:t>
+              <a:t>):</a:t>
+            </a:r>
+          </a:p>
+          <a:p>
+            <a:r>
+              <a:rPr lang="en-GB" sz="1050" dirty="0">
+                <a:latin typeface="Courier New" panose="02070309020205020404" pitchFamily="49" charset="0"/>
+                <a:cs typeface="Courier New" panose="02070309020205020404" pitchFamily="49" charset="0"/>
+              </a:rPr>
+              <a:t>    print(</a:t>
             </a:r>
             <a:r>
               <a:rPr lang="en-GB" sz="1050" dirty="0" err="1">
                 <a:latin typeface="Courier New" panose="02070309020205020404" pitchFamily="49" charset="0"/>
                 <a:cs typeface="Courier New" panose="02070309020205020404" pitchFamily="49" charset="0"/>
               </a:rPr>
-              <a:t>a,b</a:t>
+              <a:t>f"A</a:t>
             </a:r>
             <a:r>
               <a:rPr lang="en-GB" sz="1050" dirty="0">
                 <a:latin typeface="Courier New" panose="02070309020205020404" pitchFamily="49" charset="0"/>
                 <a:cs typeface="Courier New" panose="02070309020205020404" pitchFamily="49" charset="0"/>
               </a:rPr>
-              <a:t>):</a:t>
-            </a:r>
-          </a:p>
-          <a:p>
-            <a:r>
-              <a:rPr lang="en-GB" sz="1050" dirty="0">
-                <a:latin typeface="Courier New" panose="02070309020205020404" pitchFamily="49" charset="0"/>
-                <a:cs typeface="Courier New" panose="02070309020205020404" pitchFamily="49" charset="0"/>
-              </a:rPr>
-              <a:t>    print(</a:t>
-            </a:r>
-            <a:r>
-              <a:rPr lang="en-GB" sz="1050" dirty="0" err="1">
-                <a:latin typeface="Courier New" panose="02070309020205020404" pitchFamily="49" charset="0"/>
-                <a:cs typeface="Courier New" panose="02070309020205020404" pitchFamily="49" charset="0"/>
-              </a:rPr>
-              <a:t>f"A</a:t>
-            </a:r>
-            <a:r>
-              <a:rPr lang="en-GB" sz="1050" dirty="0">
-                <a:latin typeface="Courier New" panose="02070309020205020404" pitchFamily="49" charset="0"/>
-                <a:cs typeface="Courier New" panose="02070309020205020404" pitchFamily="49" charset="0"/>
-              </a:rPr>
-              <a:t> square with sides {a}m by {b}m has area {a * b}m squared")</a:t>
+              <a:t> rectangle with sides {a}m by {b}m has area {a * b}m squared")</a:t>
             </a:r>
           </a:p>
           <a:p>
@@ -10786,7 +10779,7 @@
                 <a:latin typeface="Courier New" panose="02070309020205020404" pitchFamily="49" charset="0"/>
                 <a:cs typeface="Courier New" panose="02070309020205020404" pitchFamily="49" charset="0"/>
               </a:rPr>
-              <a:t>print_area_square</a:t>
+              <a:t>print_area_rectangle</a:t>
             </a:r>
             <a:r>
               <a:rPr lang="en-GB" sz="1050" dirty="0">
@@ -10802,7 +10795,7 @@
                 <a:latin typeface="Courier New" panose="02070309020205020404" pitchFamily="49" charset="0"/>
                 <a:cs typeface="Courier New" panose="02070309020205020404" pitchFamily="49" charset="0"/>
               </a:rPr>
-              <a:t>print_area_square</a:t>
+              <a:t>print_area_rectangle</a:t>
             </a:r>
             <a:r>
               <a:rPr lang="en-GB" sz="1050" dirty="0">
@@ -10818,7 +10811,7 @@
                 <a:latin typeface="Courier New" panose="02070309020205020404" pitchFamily="49" charset="0"/>
                 <a:cs typeface="Courier New" panose="02070309020205020404" pitchFamily="49" charset="0"/>
               </a:rPr>
-              <a:t>print_area_square</a:t>
+              <a:t>print_area_rectangle</a:t>
             </a:r>
             <a:r>
               <a:rPr lang="en-GB" sz="1050" dirty="0">
@@ -10834,7 +10827,7 @@
                 <a:latin typeface="Courier New" panose="02070309020205020404" pitchFamily="49" charset="0"/>
                 <a:cs typeface="Courier New" panose="02070309020205020404" pitchFamily="49" charset="0"/>
               </a:rPr>
-              <a:t>print_area_square</a:t>
+              <a:t>print_area_rectangle</a:t>
             </a:r>
             <a:r>
               <a:rPr lang="en-GB" sz="1050" dirty="0">

</xml_diff>